<commit_message>
Revert "Revert "구현 계획서""
This reverts commit 3e31a47dddd60e930b51b2afd6ca70af816f71fe.
</commit_message>
<xml_diff>
--- a/모바일 중간보고서 20093296 배판근.pptx
+++ b/모바일 중간보고서 20093296 배판근.pptx
@@ -2595,7 +2595,7 @@
         <p:spPr>
           <a:xfrm>
             <a:off x="755576" y="2060848"/>
-            <a:ext cx="7462785" cy="2862322"/>
+            <a:ext cx="7462785" cy="3477875"/>
           </a:xfrm>
           <a:prstGeom prst="rect">
             <a:avLst/>
@@ -2798,7 +2798,7 @@
               </a:rPr>
               <a:t>를 이용한 지역검색 자동완성기능 완성</a:t>
             </a:r>
-            <a:endParaRPr lang="en-US" altLang="ko-KR" sz="2000" spc="-150" smtClean="0">
+            <a:endParaRPr lang="en-US" altLang="ko-KR" sz="2000" spc="-150" dirty="0" smtClean="0">
               <a:ln>
                 <a:solidFill>
                   <a:schemeClr val="accent1">
@@ -2857,6 +2857,156 @@
                 <a:cs typeface="Tahoma" pitchFamily="34" charset="0"/>
               </a:rPr>
               <a:t>나머지 탭 들 구현</a:t>
+            </a:r>
+            <a:endParaRPr lang="en-US" altLang="ko-KR" sz="2000" spc="-150" dirty="0" smtClean="0">
+              <a:ln>
+                <a:solidFill>
+                  <a:schemeClr val="accent1">
+                    <a:alpha val="0"/>
+                  </a:schemeClr>
+                </a:solidFill>
+              </a:ln>
+              <a:solidFill>
+                <a:srgbClr val="996633"/>
+              </a:solidFill>
+              <a:latin typeface="HY견고딕" pitchFamily="18" charset="-127"/>
+              <a:ea typeface="HY견고딕" pitchFamily="18" charset="-127"/>
+              <a:cs typeface="Tahoma" pitchFamily="34" charset="0"/>
+            </a:endParaRPr>
+          </a:p>
+          <a:p>
+            <a:pPr marL="457200" indent="-457200">
+              <a:buFont typeface="Arial" panose="020B0604020202020204" pitchFamily="34" charset="0"/>
+              <a:buChar char="•"/>
+            </a:pPr>
+            <a:endParaRPr lang="en-US" altLang="ko-KR" sz="2000" spc="-150" dirty="0">
+              <a:ln>
+                <a:solidFill>
+                  <a:schemeClr val="accent1">
+                    <a:alpha val="0"/>
+                  </a:schemeClr>
+                </a:solidFill>
+              </a:ln>
+              <a:solidFill>
+                <a:srgbClr val="996633"/>
+              </a:solidFill>
+              <a:latin typeface="HY견고딕" pitchFamily="18" charset="-127"/>
+              <a:ea typeface="HY견고딕" pitchFamily="18" charset="-127"/>
+              <a:cs typeface="Tahoma" pitchFamily="34" charset="0"/>
+            </a:endParaRPr>
+          </a:p>
+          <a:p>
+            <a:pPr marL="457200" indent="-457200">
+              <a:buFont typeface="Arial" panose="020B0604020202020204" pitchFamily="34" charset="0"/>
+              <a:buChar char="•"/>
+            </a:pPr>
+            <a:r>
+              <a:rPr lang="ko-KR" altLang="en-US" sz="2000" spc="-150" dirty="0" err="1" smtClean="0">
+                <a:ln>
+                  <a:solidFill>
+                    <a:schemeClr val="accent1">
+                      <a:alpha val="0"/>
+                    </a:schemeClr>
+                  </a:solidFill>
+                </a:ln>
+                <a:solidFill>
+                  <a:srgbClr val="996633"/>
+                </a:solidFill>
+                <a:latin typeface="HY견고딕" pitchFamily="18" charset="-127"/>
+                <a:ea typeface="HY견고딕" pitchFamily="18" charset="-127"/>
+                <a:cs typeface="Tahoma" pitchFamily="34" charset="0"/>
+              </a:rPr>
+              <a:t>매칭</a:t>
+            </a:r>
+            <a:r>
+              <a:rPr lang="ko-KR" altLang="en-US" sz="2000" spc="-150" dirty="0" smtClean="0">
+                <a:ln>
+                  <a:solidFill>
+                    <a:schemeClr val="accent1">
+                      <a:alpha val="0"/>
+                    </a:schemeClr>
+                  </a:solidFill>
+                </a:ln>
+                <a:solidFill>
+                  <a:srgbClr val="996633"/>
+                </a:solidFill>
+                <a:latin typeface="HY견고딕" pitchFamily="18" charset="-127"/>
+                <a:ea typeface="HY견고딕" pitchFamily="18" charset="-127"/>
+                <a:cs typeface="Tahoma" pitchFamily="34" charset="0"/>
+              </a:rPr>
+              <a:t> 시스템 구현 </a:t>
+            </a:r>
+            <a:r>
+              <a:rPr lang="en-US" altLang="ko-KR" sz="2000" spc="-150" dirty="0" smtClean="0">
+                <a:ln>
+                  <a:solidFill>
+                    <a:schemeClr val="accent1">
+                      <a:alpha val="0"/>
+                    </a:schemeClr>
+                  </a:solidFill>
+                </a:ln>
+                <a:solidFill>
+                  <a:srgbClr val="996633"/>
+                </a:solidFill>
+                <a:latin typeface="HY견고딕" pitchFamily="18" charset="-127"/>
+                <a:ea typeface="HY견고딕" pitchFamily="18" charset="-127"/>
+                <a:cs typeface="Tahoma" pitchFamily="34" charset="0"/>
+              </a:rPr>
+              <a:t>-&gt; </a:t>
+            </a:r>
+            <a:r>
+              <a:rPr lang="ko-KR" altLang="en-US" sz="2000" spc="-150" dirty="0" smtClean="0">
+                <a:ln>
+                  <a:solidFill>
+                    <a:schemeClr val="accent1">
+                      <a:alpha val="0"/>
+                    </a:schemeClr>
+                  </a:solidFill>
+                </a:ln>
+                <a:solidFill>
+                  <a:srgbClr val="996633"/>
+                </a:solidFill>
+                <a:latin typeface="HY견고딕" pitchFamily="18" charset="-127"/>
+                <a:ea typeface="HY견고딕" pitchFamily="18" charset="-127"/>
+                <a:cs typeface="Tahoma" pitchFamily="34" charset="0"/>
+              </a:rPr>
+              <a:t>우리 팀과 가까운 팀을 찾아서 </a:t>
+            </a:r>
+            <a:r>
+              <a:rPr lang="ko-KR" altLang="en-US" sz="2000" spc="-150" err="1" smtClean="0">
+                <a:ln>
+                  <a:solidFill>
+                    <a:schemeClr val="accent1">
+                      <a:alpha val="0"/>
+                    </a:schemeClr>
+                  </a:solidFill>
+                </a:ln>
+                <a:solidFill>
+                  <a:srgbClr val="996633"/>
+                </a:solidFill>
+                <a:latin typeface="HY견고딕" pitchFamily="18" charset="-127"/>
+                <a:ea typeface="HY견고딕" pitchFamily="18" charset="-127"/>
+                <a:cs typeface="Tahoma" pitchFamily="34" charset="0"/>
+              </a:rPr>
+              <a:t>매칭</a:t>
+            </a:r>
+            <a:r>
+              <a:rPr lang="ko-KR" altLang="en-US" sz="2000" spc="-150" smtClean="0">
+                <a:ln>
+                  <a:solidFill>
+                    <a:schemeClr val="accent1">
+                      <a:alpha val="0"/>
+                    </a:schemeClr>
+                  </a:solidFill>
+                </a:ln>
+                <a:solidFill>
+                  <a:srgbClr val="996633"/>
+                </a:solidFill>
+                <a:latin typeface="HY견고딕" pitchFamily="18" charset="-127"/>
+                <a:ea typeface="HY견고딕" pitchFamily="18" charset="-127"/>
+                <a:cs typeface="Tahoma" pitchFamily="34" charset="0"/>
+              </a:rPr>
+              <a:t> 시킨다</a:t>
             </a:r>
             <a:endParaRPr lang="en-US" altLang="ko-KR" sz="2000" spc="-150" dirty="0" smtClean="0">
               <a:ln>
@@ -4342,7 +4492,7 @@
             <a:pPr algn="ctr"/>
             <a:r>
               <a:rPr lang="en-US" altLang="ko-KR" dirty="0" smtClean="0"/>
-              <a:t>Tab1 Activity</a:t>
+              <a:t>Match Activity</a:t>
             </a:r>
             <a:endParaRPr lang="ko-KR" altLang="en-US" dirty="0"/>
           </a:p>
@@ -4385,8 +4535,12 @@
           <a:p>
             <a:pPr algn="ctr"/>
             <a:r>
+              <a:rPr lang="en-US" altLang="ko-KR" dirty="0"/>
+              <a:t>S</a:t>
+            </a:r>
+            <a:r>
               <a:rPr lang="en-US" altLang="ko-KR" dirty="0" smtClean="0"/>
-              <a:t>Tab2 </a:t>
+              <a:t>earch </a:t>
             </a:r>
             <a:r>
               <a:rPr lang="en-US" altLang="ko-KR" dirty="0"/>
@@ -4434,7 +4588,11 @@
             <a:pPr algn="ctr"/>
             <a:r>
               <a:rPr lang="en-US" altLang="ko-KR" dirty="0" smtClean="0"/>
-              <a:t>Tab3 </a:t>
+              <a:t>Team</a:t>
+            </a:r>
+            <a:r>
+              <a:rPr lang="en-US" altLang="ko-KR" dirty="0" smtClean="0"/>
+              <a:t> </a:t>
             </a:r>
             <a:r>
               <a:rPr lang="en-US" altLang="ko-KR" dirty="0"/>
@@ -4482,10 +4640,10 @@
             <a:pPr algn="ctr"/>
             <a:r>
               <a:rPr lang="en-US" altLang="ko-KR" dirty="0" smtClean="0"/>
-              <a:t>Tab4 </a:t>
-            </a:r>
-            <a:r>
-              <a:rPr lang="en-US" altLang="ko-KR" dirty="0"/>
+              <a:t>Profile </a:t>
+            </a:r>
+            <a:r>
+              <a:rPr lang="en-US" altLang="ko-KR" dirty="0" smtClean="0"/>
               <a:t>Activity</a:t>
             </a:r>
             <a:endParaRPr lang="ko-KR" altLang="en-US" dirty="0"/>

</xml_diff>